<commit_message>
added some stuff to the presentation
</commit_message>
<xml_diff>
--- a/Eleven Wise Monkeys.pptx
+++ b/Eleven Wise Monkeys.pptx
@@ -504,7 +504,6 @@
               <a:rPr lang="en-US" smtClean="0"/>
               <a:t>Fifth level</a:t>
             </a:r>
-            <a:endParaRPr lang="en-US" smtClean="0"/>
           </a:p>
         </p:txBody>
       </p:sp>
@@ -937,7 +936,6 @@
               <a:rPr lang="en-US" smtClean="0"/>
               <a:t>Fifth level</a:t>
             </a:r>
-            <a:endParaRPr lang="en-US" smtClean="0"/>
           </a:p>
         </p:txBody>
       </p:sp>
@@ -994,7 +992,6 @@
               <a:rPr lang="en-US" smtClean="0"/>
               <a:t>Fifth level</a:t>
             </a:r>
-            <a:endParaRPr lang="en-US" smtClean="0"/>
           </a:p>
         </p:txBody>
       </p:sp>
@@ -1170,7 +1167,6 @@
               <a:rPr lang="en-US" smtClean="0"/>
               <a:t>Fifth level</a:t>
             </a:r>
-            <a:endParaRPr lang="en-US" smtClean="0"/>
           </a:p>
         </p:txBody>
       </p:sp>
@@ -1370,7 +1366,6 @@
               <a:rPr lang="en-US" smtClean="0"/>
               <a:t>Fifth level</a:t>
             </a:r>
-            <a:endParaRPr lang="en-US" smtClean="0"/>
           </a:p>
         </p:txBody>
       </p:sp>
@@ -1427,7 +1422,6 @@
               <a:rPr lang="en-US" smtClean="0"/>
               <a:t>Fifth level</a:t>
             </a:r>
-            <a:endParaRPr lang="en-US" smtClean="0"/>
           </a:p>
         </p:txBody>
       </p:sp>
@@ -2701,7 +2695,7 @@
         <p:spPr/>
         <p:txBody>
           <a:bodyPr>
-            <a:normAutofit/>
+            <a:normAutofit fontScale="92500"/>
           </a:bodyPr>
           <a:lstStyle/>
           <a:p>
@@ -2757,7 +2751,32 @@
             </a:r>
             <a:r>
               <a:rPr lang="en-US" sz="2600" dirty="0" smtClean="0"/>
-              <a:t> is really useful, but merging is painful</a:t>
+              <a:t> is really useful, but merging is </a:t>
+            </a:r>
+            <a:r>
+              <a:rPr lang="en-US" sz="2600" dirty="0" smtClean="0"/>
+              <a:t>painful</a:t>
+            </a:r>
+          </a:p>
+          <a:p>
+            <a:pPr>
+              <a:lnSpc>
+                <a:spcPct val="200000"/>
+              </a:lnSpc>
+              <a:buFont typeface="Times New Roman" panose="02020603050405020304" pitchFamily="18" charset="0"/>
+              <a:buChar char="ↄ"/>
+            </a:pPr>
+            <a:r>
+              <a:rPr lang="en-US" sz="2600" dirty="0" smtClean="0"/>
+              <a:t>Changing the board size and adding </a:t>
+            </a:r>
+            <a:r>
+              <a:rPr lang="en-US" sz="2600" smtClean="0"/>
+              <a:t>players cause </a:t>
+            </a:r>
+            <a:r>
+              <a:rPr lang="en-US" sz="2600" dirty="0" smtClean="0"/>
+              <a:t>massive headaches when rewriting test cases</a:t>
             </a:r>
             <a:endParaRPr lang="en-US" sz="2600" dirty="0"/>
           </a:p>
@@ -2815,11 +2834,11 @@
   <p:clrMapOvr>
     <a:masterClrMapping/>
   </p:clrMapOvr>
-  <mc:AlternateContent xmlns:mc="http://schemas.openxmlformats.org/markup-compatibility/2006">
-    <mc:Choice xmlns:p14="http://schemas.microsoft.com/office/powerpoint/2010/main" Requires="p14">
+  <mc:AlternateContent xmlns:mc="http://schemas.openxmlformats.org/markup-compatibility/2006" xmlns:p14="http://schemas.microsoft.com/office/powerpoint/2010/main">
+    <mc:Choice Requires="p14">
       <p:transition p14:dur="0"/>
     </mc:Choice>
-    <mc:Fallback>
+    <mc:Fallback xmlns="">
       <p:transition/>
     </mc:Fallback>
   </mc:AlternateContent>

</xml_diff>